<commit_message>
Playground change and some pptx docs
</commit_message>
<xml_diff>
--- a/Docs/neo4j meshtastic schema.pptx
+++ b/Docs/neo4j meshtastic schema.pptx
@@ -6,6 +6,7 @@
   </p:sldMasterIdLst>
   <p:sldIdLst>
     <p:sldId id="256" r:id="rId2"/>
+    <p:sldId id="257" r:id="rId3"/>
   </p:sldIdLst>
   <p:sldSz cx="12192000" cy="6858000"/>
   <p:notesSz cx="6858000" cy="9144000"/>
@@ -104,7 +105,112 @@
       </a:defRPr>
     </a:lvl9pPr>
   </p:defaultTextStyle>
+  <p:extLst>
+    <p:ext uri="{EFAFB233-063F-42B5-8137-9DF3F51BA10A}">
+      <p15:sldGuideLst xmlns:p15="http://schemas.microsoft.com/office/powerpoint/2012/main"/>
+    </p:ext>
+  </p:extLst>
 </p:presentation>
+</file>
+
+<file path=ppt/revisionInfo.xml><?xml version="1.0" encoding="utf-8"?>
+<p1510:revInfo xmlns:a="http://schemas.openxmlformats.org/drawingml/2006/main" xmlns:r="http://schemas.openxmlformats.org/officeDocument/2006/relationships" xmlns:p1510="http://schemas.microsoft.com/office/powerpoint/2015/10/main">
+  <p1510:revLst>
+    <p1510:client id="{5FAF03B0-586D-724A-BBA2-C5EBC782E24C}" v="2" dt="2025-03-23T21:02:45.310"/>
+  </p1510:revLst>
+</p1510:revInfo>
+</file>
+
+<file path=ppt/changesInfos/changesInfo1.xml><?xml version="1.0" encoding="utf-8"?>
+<pc:chgInfo xmlns:a="http://schemas.openxmlformats.org/drawingml/2006/main" xmlns:r="http://schemas.openxmlformats.org/officeDocument/2006/relationships" xmlns:ac="http://schemas.microsoft.com/office/drawing/2013/main/command" xmlns:pc="http://schemas.microsoft.com/office/powerpoint/2013/main/command">
+  <pc:docChgLst>
+    <pc:chgData name="Larry da Ponte" userId="0b4b7e697cfa57e2" providerId="LiveId" clId="{5FAF03B0-586D-724A-BBA2-C5EBC782E24C}"/>
+    <pc:docChg chg="undo custSel addSld modSld">
+      <pc:chgData name="Larry da Ponte" userId="0b4b7e697cfa57e2" providerId="LiveId" clId="{5FAF03B0-586D-724A-BBA2-C5EBC782E24C}" dt="2025-03-23T21:02:48.397" v="356" actId="1076"/>
+      <pc:docMkLst>
+        <pc:docMk/>
+      </pc:docMkLst>
+      <pc:sldChg chg="addSp modSp mod">
+        <pc:chgData name="Larry da Ponte" userId="0b4b7e697cfa57e2" providerId="LiveId" clId="{5FAF03B0-586D-724A-BBA2-C5EBC782E24C}" dt="2025-03-23T21:02:48.397" v="356" actId="1076"/>
+        <pc:sldMkLst>
+          <pc:docMk/>
+          <pc:sldMk cId="889197179" sldId="256"/>
+        </pc:sldMkLst>
+        <pc:spChg chg="mod">
+          <ac:chgData name="Larry da Ponte" userId="0b4b7e697cfa57e2" providerId="LiveId" clId="{5FAF03B0-586D-724A-BBA2-C5EBC782E24C}" dt="2025-03-23T21:02:39.686" v="354" actId="1076"/>
+          <ac:spMkLst>
+            <pc:docMk/>
+            <pc:sldMk cId="889197179" sldId="256"/>
+            <ac:spMk id="4" creationId="{0D61E4CF-4EAD-B424-E44D-257C391E447C}"/>
+          </ac:spMkLst>
+        </pc:spChg>
+        <pc:spChg chg="mod">
+          <ac:chgData name="Larry da Ponte" userId="0b4b7e697cfa57e2" providerId="LiveId" clId="{5FAF03B0-586D-724A-BBA2-C5EBC782E24C}" dt="2025-03-23T21:02:39.686" v="354" actId="1076"/>
+          <ac:spMkLst>
+            <pc:docMk/>
+            <pc:sldMk cId="889197179" sldId="256"/>
+            <ac:spMk id="5" creationId="{4CA4D935-AE4C-8DBC-2D1E-19E1B3C38A9D}"/>
+          </ac:spMkLst>
+        </pc:spChg>
+        <pc:spChg chg="mod">
+          <ac:chgData name="Larry da Ponte" userId="0b4b7e697cfa57e2" providerId="LiveId" clId="{5FAF03B0-586D-724A-BBA2-C5EBC782E24C}" dt="2025-03-23T21:02:39.686" v="354" actId="1076"/>
+          <ac:spMkLst>
+            <pc:docMk/>
+            <pc:sldMk cId="889197179" sldId="256"/>
+            <ac:spMk id="6" creationId="{B7223CF9-B962-76D1-45DC-9ADF653244B9}"/>
+          </ac:spMkLst>
+        </pc:spChg>
+        <pc:spChg chg="add mod">
+          <ac:chgData name="Larry da Ponte" userId="0b4b7e697cfa57e2" providerId="LiveId" clId="{5FAF03B0-586D-724A-BBA2-C5EBC782E24C}" dt="2025-03-23T21:02:48.397" v="356" actId="1076"/>
+          <ac:spMkLst>
+            <pc:docMk/>
+            <pc:sldMk cId="889197179" sldId="256"/>
+            <ac:spMk id="13" creationId="{78EEDC75-271E-1D53-906B-22DC6278DF4A}"/>
+          </ac:spMkLst>
+        </pc:spChg>
+        <pc:cxnChg chg="add mod">
+          <ac:chgData name="Larry da Ponte" userId="0b4b7e697cfa57e2" providerId="LiveId" clId="{5FAF03B0-586D-724A-BBA2-C5EBC782E24C}" dt="2025-03-23T21:02:39.686" v="354" actId="1076"/>
+          <ac:cxnSpMkLst>
+            <pc:docMk/>
+            <pc:sldMk cId="889197179" sldId="256"/>
+            <ac:cxnSpMk id="3" creationId="{7CFE22BE-F7E0-ECAD-F569-F1E5AF741355}"/>
+          </ac:cxnSpMkLst>
+        </pc:cxnChg>
+        <pc:cxnChg chg="add mod">
+          <ac:chgData name="Larry da Ponte" userId="0b4b7e697cfa57e2" providerId="LiveId" clId="{5FAF03B0-586D-724A-BBA2-C5EBC782E24C}" dt="2025-03-23T21:02:39.686" v="354" actId="1076"/>
+          <ac:cxnSpMkLst>
+            <pc:docMk/>
+            <pc:sldMk cId="889197179" sldId="256"/>
+            <ac:cxnSpMk id="7" creationId="{51AA7000-3F9E-2723-C108-B2D6530693C3}"/>
+          </ac:cxnSpMkLst>
+        </pc:cxnChg>
+      </pc:sldChg>
+      <pc:sldChg chg="delSp modSp new mod">
+        <pc:chgData name="Larry da Ponte" userId="0b4b7e697cfa57e2" providerId="LiveId" clId="{5FAF03B0-586D-724A-BBA2-C5EBC782E24C}" dt="2025-03-23T20:56:17.335" v="321" actId="20577"/>
+        <pc:sldMkLst>
+          <pc:docMk/>
+          <pc:sldMk cId="252806561" sldId="257"/>
+        </pc:sldMkLst>
+        <pc:spChg chg="del">
+          <ac:chgData name="Larry da Ponte" userId="0b4b7e697cfa57e2" providerId="LiveId" clId="{5FAF03B0-586D-724A-BBA2-C5EBC782E24C}" dt="2025-03-23T20:27:43.102" v="1" actId="478"/>
+          <ac:spMkLst>
+            <pc:docMk/>
+            <pc:sldMk cId="252806561" sldId="257"/>
+            <ac:spMk id="2" creationId="{CC780A3E-2D83-373F-0FAD-701BFC7ABDD2}"/>
+          </ac:spMkLst>
+        </pc:spChg>
+        <pc:spChg chg="mod">
+          <ac:chgData name="Larry da Ponte" userId="0b4b7e697cfa57e2" providerId="LiveId" clId="{5FAF03B0-586D-724A-BBA2-C5EBC782E24C}" dt="2025-03-23T20:56:17.335" v="321" actId="20577"/>
+          <ac:spMkLst>
+            <pc:docMk/>
+            <pc:sldMk cId="252806561" sldId="257"/>
+            <ac:spMk id="3" creationId="{1AD1A068-ADE1-884A-E08A-84615F3378CF}"/>
+          </ac:spMkLst>
+        </pc:spChg>
+      </pc:sldChg>
+    </pc:docChg>
+  </pc:docChgLst>
+</pc:chgInfo>
 </file>
 
 <file path=ppt/slideLayouts/slideLayout1.xml><?xml version="1.0" encoding="utf-8"?>
@@ -254,7 +360,7 @@
           <a:p>
             <a:fld id="{8DA195EE-EBD5-874E-B75A-B48BDCA66474}" type="datetimeFigureOut">
               <a:rPr lang="en-US" smtClean="0"/>
-              <a:t>3/21/25</a:t>
+              <a:t>3/23/25</a:t>
             </a:fld>
             <a:endParaRPr lang="en-US"/>
           </a:p>
@@ -452,7 +558,7 @@
           <a:p>
             <a:fld id="{8DA195EE-EBD5-874E-B75A-B48BDCA66474}" type="datetimeFigureOut">
               <a:rPr lang="en-US" smtClean="0"/>
-              <a:t>3/21/25</a:t>
+              <a:t>3/23/25</a:t>
             </a:fld>
             <a:endParaRPr lang="en-US"/>
           </a:p>
@@ -660,7 +766,7 @@
           <a:p>
             <a:fld id="{8DA195EE-EBD5-874E-B75A-B48BDCA66474}" type="datetimeFigureOut">
               <a:rPr lang="en-US" smtClean="0"/>
-              <a:t>3/21/25</a:t>
+              <a:t>3/23/25</a:t>
             </a:fld>
             <a:endParaRPr lang="en-US"/>
           </a:p>
@@ -858,7 +964,7 @@
           <a:p>
             <a:fld id="{8DA195EE-EBD5-874E-B75A-B48BDCA66474}" type="datetimeFigureOut">
               <a:rPr lang="en-US" smtClean="0"/>
-              <a:t>3/21/25</a:t>
+              <a:t>3/23/25</a:t>
             </a:fld>
             <a:endParaRPr lang="en-US"/>
           </a:p>
@@ -1133,7 +1239,7 @@
           <a:p>
             <a:fld id="{8DA195EE-EBD5-874E-B75A-B48BDCA66474}" type="datetimeFigureOut">
               <a:rPr lang="en-US" smtClean="0"/>
-              <a:t>3/21/25</a:t>
+              <a:t>3/23/25</a:t>
             </a:fld>
             <a:endParaRPr lang="en-US"/>
           </a:p>
@@ -1398,7 +1504,7 @@
           <a:p>
             <a:fld id="{8DA195EE-EBD5-874E-B75A-B48BDCA66474}" type="datetimeFigureOut">
               <a:rPr lang="en-US" smtClean="0"/>
-              <a:t>3/21/25</a:t>
+              <a:t>3/23/25</a:t>
             </a:fld>
             <a:endParaRPr lang="en-US"/>
           </a:p>
@@ -1810,7 +1916,7 @@
           <a:p>
             <a:fld id="{8DA195EE-EBD5-874E-B75A-B48BDCA66474}" type="datetimeFigureOut">
               <a:rPr lang="en-US" smtClean="0"/>
-              <a:t>3/21/25</a:t>
+              <a:t>3/23/25</a:t>
             </a:fld>
             <a:endParaRPr lang="en-US"/>
           </a:p>
@@ -1951,7 +2057,7 @@
           <a:p>
             <a:fld id="{8DA195EE-EBD5-874E-B75A-B48BDCA66474}" type="datetimeFigureOut">
               <a:rPr lang="en-US" smtClean="0"/>
-              <a:t>3/21/25</a:t>
+              <a:t>3/23/25</a:t>
             </a:fld>
             <a:endParaRPr lang="en-US"/>
           </a:p>
@@ -2064,7 +2170,7 @@
           <a:p>
             <a:fld id="{8DA195EE-EBD5-874E-B75A-B48BDCA66474}" type="datetimeFigureOut">
               <a:rPr lang="en-US" smtClean="0"/>
-              <a:t>3/21/25</a:t>
+              <a:t>3/23/25</a:t>
             </a:fld>
             <a:endParaRPr lang="en-US"/>
           </a:p>
@@ -2375,7 +2481,7 @@
           <a:p>
             <a:fld id="{8DA195EE-EBD5-874E-B75A-B48BDCA66474}" type="datetimeFigureOut">
               <a:rPr lang="en-US" smtClean="0"/>
-              <a:t>3/21/25</a:t>
+              <a:t>3/23/25</a:t>
             </a:fld>
             <a:endParaRPr lang="en-US"/>
           </a:p>
@@ -2663,7 +2769,7 @@
           <a:p>
             <a:fld id="{8DA195EE-EBD5-874E-B75A-B48BDCA66474}" type="datetimeFigureOut">
               <a:rPr lang="en-US" smtClean="0"/>
-              <a:t>3/21/25</a:t>
+              <a:t>3/23/25</a:t>
             </a:fld>
             <a:endParaRPr lang="en-US"/>
           </a:p>
@@ -2904,7 +3010,7 @@
           <a:p>
             <a:fld id="{8DA195EE-EBD5-874E-B75A-B48BDCA66474}" type="datetimeFigureOut">
               <a:rPr lang="en-US" smtClean="0"/>
-              <a:t>3/21/25</a:t>
+              <a:t>3/23/25</a:t>
             </a:fld>
             <a:endParaRPr lang="en-US"/>
           </a:p>
@@ -3335,8 +3441,8 @@
         </p:nvSpPr>
         <p:spPr>
           <a:xfrm>
-            <a:off x="1036285" y="2494695"/>
-            <a:ext cx="1634836" cy="1634836"/>
+            <a:off x="2888234" y="2691098"/>
+            <a:ext cx="766757" cy="737902"/>
           </a:xfrm>
           <a:prstGeom prst="ellipse">
             <a:avLst/>
@@ -3364,14 +3470,7 @@
           <a:p>
             <a:pPr algn="ctr"/>
             <a:r>
-              <a:rPr lang="en-US" dirty="0"/>
-              <a:t>Mesh</a:t>
-            </a:r>
-          </a:p>
-          <a:p>
-            <a:pPr algn="ctr"/>
-            <a:r>
-              <a:rPr lang="en-US" dirty="0"/>
+              <a:rPr lang="en-US" sz="1100" dirty="0"/>
               <a:t>Node</a:t>
             </a:r>
           </a:p>
@@ -3391,8 +3490,8 @@
         </p:nvSpPr>
         <p:spPr>
           <a:xfrm>
-            <a:off x="6293120" y="2494695"/>
-            <a:ext cx="1634836" cy="1634836"/>
+            <a:off x="6739077" y="2691098"/>
+            <a:ext cx="766757" cy="737902"/>
           </a:xfrm>
           <a:prstGeom prst="ellipse">
             <a:avLst/>
@@ -3420,14 +3519,7 @@
           <a:p>
             <a:pPr algn="ctr"/>
             <a:r>
-              <a:rPr lang="en-US" dirty="0"/>
-              <a:t>Mesh</a:t>
-            </a:r>
-          </a:p>
-          <a:p>
-            <a:pPr algn="ctr"/>
-            <a:r>
-              <a:rPr lang="en-US" dirty="0"/>
+              <a:rPr lang="en-US" sz="1100" dirty="0"/>
               <a:t>Node</a:t>
             </a:r>
           </a:p>
@@ -3447,8 +3539,8 @@
         </p:nvSpPr>
         <p:spPr>
           <a:xfrm>
-            <a:off x="3345084" y="3074832"/>
-            <a:ext cx="2326511" cy="474562"/>
+            <a:off x="4570697" y="2887501"/>
+            <a:ext cx="1252674" cy="354168"/>
           </a:xfrm>
           <a:prstGeom prst="rect">
             <a:avLst/>
@@ -3476,7 +3568,141 @@
           <a:p>
             <a:pPr algn="ctr"/>
             <a:r>
-              <a:rPr lang="en-US" dirty="0"/>
+              <a:rPr lang="en-US" sz="1100" dirty="0"/>
+              <a:t>Message</a:t>
+            </a:r>
+          </a:p>
+        </p:txBody>
+      </p:sp>
+      <p:cxnSp>
+        <p:nvCxnSpPr>
+          <p:cNvPr id="3" name="Straight Arrow Connector 2">
+            <a:extLst>
+              <a:ext uri="{FF2B5EF4-FFF2-40B4-BE49-F238E27FC236}">
+                <a16:creationId xmlns:a16="http://schemas.microsoft.com/office/drawing/2014/main" id="{7CFE22BE-F7E0-ECAD-F569-F1E5AF741355}"/>
+              </a:ext>
+            </a:extLst>
+          </p:cNvPr>
+          <p:cNvCxnSpPr>
+            <a:stCxn id="4" idx="6"/>
+            <a:endCxn id="6" idx="1"/>
+          </p:cNvCxnSpPr>
+          <p:nvPr/>
+        </p:nvCxnSpPr>
+        <p:spPr>
+          <a:xfrm>
+            <a:off x="3654991" y="3060049"/>
+            <a:ext cx="915706" cy="4536"/>
+          </a:xfrm>
+          <a:prstGeom prst="straightConnector1">
+            <a:avLst/>
+          </a:prstGeom>
+          <a:ln>
+            <a:tailEnd type="triangle"/>
+          </a:ln>
+        </p:spPr>
+        <p:style>
+          <a:lnRef idx="2">
+            <a:schemeClr val="accent1"/>
+          </a:lnRef>
+          <a:fillRef idx="0">
+            <a:schemeClr val="accent1"/>
+          </a:fillRef>
+          <a:effectRef idx="1">
+            <a:schemeClr val="accent1"/>
+          </a:effectRef>
+          <a:fontRef idx="minor">
+            <a:schemeClr val="tx1"/>
+          </a:fontRef>
+        </p:style>
+      </p:cxnSp>
+      <p:cxnSp>
+        <p:nvCxnSpPr>
+          <p:cNvPr id="7" name="Straight Arrow Connector 6">
+            <a:extLst>
+              <a:ext uri="{FF2B5EF4-FFF2-40B4-BE49-F238E27FC236}">
+                <a16:creationId xmlns:a16="http://schemas.microsoft.com/office/drawing/2014/main" id="{51AA7000-3F9E-2723-C108-B2D6530693C3}"/>
+              </a:ext>
+            </a:extLst>
+          </p:cNvPr>
+          <p:cNvCxnSpPr>
+            <a:cxnSpLocks/>
+            <a:stCxn id="6" idx="3"/>
+            <a:endCxn id="5" idx="2"/>
+          </p:cNvCxnSpPr>
+          <p:nvPr/>
+        </p:nvCxnSpPr>
+        <p:spPr>
+          <a:xfrm flipV="1">
+            <a:off x="5823371" y="3060049"/>
+            <a:ext cx="915706" cy="4536"/>
+          </a:xfrm>
+          <a:prstGeom prst="straightConnector1">
+            <a:avLst/>
+          </a:prstGeom>
+          <a:ln>
+            <a:tailEnd type="triangle"/>
+          </a:ln>
+        </p:spPr>
+        <p:style>
+          <a:lnRef idx="2">
+            <a:schemeClr val="accent1"/>
+          </a:lnRef>
+          <a:fillRef idx="0">
+            <a:schemeClr val="accent1"/>
+          </a:fillRef>
+          <a:effectRef idx="1">
+            <a:schemeClr val="accent1"/>
+          </a:effectRef>
+          <a:fontRef idx="minor">
+            <a:schemeClr val="tx1"/>
+          </a:fontRef>
+        </p:style>
+      </p:cxnSp>
+      <p:sp>
+        <p:nvSpPr>
+          <p:cNvPr id="13" name="Rectangle 12">
+            <a:extLst>
+              <a:ext uri="{FF2B5EF4-FFF2-40B4-BE49-F238E27FC236}">
+                <a16:creationId xmlns:a16="http://schemas.microsoft.com/office/drawing/2014/main" id="{78EEDC75-271E-1D53-906B-22DC6278DF4A}"/>
+              </a:ext>
+            </a:extLst>
+          </p:cNvPr>
+          <p:cNvSpPr/>
+          <p:nvPr/>
+        </p:nvSpPr>
+        <p:spPr>
+          <a:xfrm>
+            <a:off x="4213811" y="4764529"/>
+            <a:ext cx="1252674" cy="354168"/>
+          </a:xfrm>
+          <a:prstGeom prst="rect">
+            <a:avLst/>
+          </a:prstGeom>
+        </p:spPr>
+        <p:style>
+          <a:lnRef idx="2">
+            <a:schemeClr val="accent1">
+              <a:shade val="15000"/>
+            </a:schemeClr>
+          </a:lnRef>
+          <a:fillRef idx="1">
+            <a:schemeClr val="accent1"/>
+          </a:fillRef>
+          <a:effectRef idx="0">
+            <a:schemeClr val="accent1"/>
+          </a:effectRef>
+          <a:fontRef idx="minor">
+            <a:schemeClr val="lt1"/>
+          </a:fontRef>
+        </p:style>
+        <p:txBody>
+          <a:bodyPr rtlCol="0" anchor="ctr"/>
+          <a:lstStyle/>
+          <a:p>
+            <a:pPr algn="ctr"/>
+            <a:r>
+              <a:rPr lang="en-US" sz="1100" dirty="0"/>
               <a:t>Message</a:t>
             </a:r>
           </a:p>
@@ -3486,6 +3712,187 @@
     <p:extLst>
       <p:ext uri="{BB962C8B-B14F-4D97-AF65-F5344CB8AC3E}">
         <p14:creationId xmlns:p14="http://schemas.microsoft.com/office/powerpoint/2010/main" val="889197179"/>
+      </p:ext>
+    </p:extLst>
+  </p:cSld>
+  <p:clrMapOvr>
+    <a:masterClrMapping/>
+  </p:clrMapOvr>
+</p:sld>
+</file>
+
+<file path=ppt/slides/slide2.xml><?xml version="1.0" encoding="utf-8"?>
+<p:sld xmlns:a="http://schemas.openxmlformats.org/drawingml/2006/main" xmlns:r="http://schemas.openxmlformats.org/officeDocument/2006/relationships" xmlns:p="http://schemas.openxmlformats.org/presentationml/2006/main">
+  <p:cSld>
+    <p:spTree>
+      <p:nvGrpSpPr>
+        <p:cNvPr id="1" name=""/>
+        <p:cNvGrpSpPr/>
+        <p:nvPr/>
+      </p:nvGrpSpPr>
+      <p:grpSpPr>
+        <a:xfrm>
+          <a:off x="0" y="0"/>
+          <a:ext cx="0" cy="0"/>
+          <a:chOff x="0" y="0"/>
+          <a:chExt cx="0" cy="0"/>
+        </a:xfrm>
+      </p:grpSpPr>
+      <p:sp>
+        <p:nvSpPr>
+          <p:cNvPr id="3" name="Content Placeholder 2">
+            <a:extLst>
+              <a:ext uri="{FF2B5EF4-FFF2-40B4-BE49-F238E27FC236}">
+                <a16:creationId xmlns:a16="http://schemas.microsoft.com/office/drawing/2014/main" id="{1AD1A068-ADE1-884A-E08A-84615F3378CF}"/>
+              </a:ext>
+            </a:extLst>
+          </p:cNvPr>
+          <p:cNvSpPr>
+            <a:spLocks noGrp="1"/>
+          </p:cNvSpPr>
+          <p:nvPr>
+            <p:ph idx="1"/>
+          </p:nvPr>
+        </p:nvSpPr>
+        <p:spPr>
+          <a:xfrm>
+            <a:off x="489397" y="425003"/>
+            <a:ext cx="10864403" cy="5751960"/>
+          </a:xfrm>
+        </p:spPr>
+        <p:txBody>
+          <a:bodyPr>
+            <a:normAutofit fontScale="85000" lnSpcReduction="20000"/>
+          </a:bodyPr>
+          <a:lstStyle/>
+          <a:p>
+            <a:pPr marL="0" indent="0">
+              <a:buNone/>
+            </a:pPr>
+            <a:r>
+              <a:rPr lang="en-US" dirty="0"/>
+              <a:t>Node Info</a:t>
+            </a:r>
+          </a:p>
+          <a:p>
+            <a:pPr lvl="1"/>
+            <a:r>
+              <a:rPr lang="en-US" dirty="0"/>
+              <a:t>Check if the ”to” field is set to the broadcast channel id 0xffffffff (decimal 4294967295), if it is, connect the node</a:t>
+            </a:r>
+          </a:p>
+          <a:p>
+            <a:pPr lvl="1"/>
+            <a:br>
+              <a:rPr lang="en-US" dirty="0"/>
+            </a:br>
+            <a:endParaRPr lang="en-US" dirty="0"/>
+          </a:p>
+          <a:p>
+            <a:pPr marL="0" indent="0">
+              <a:buNone/>
+            </a:pPr>
+            <a:r>
+              <a:rPr lang="en-US" dirty="0"/>
+              <a:t>Position</a:t>
+            </a:r>
+          </a:p>
+          <a:p>
+            <a:pPr marL="0" indent="0">
+              <a:buNone/>
+            </a:pPr>
+            <a:r>
+              <a:rPr lang="en-US" dirty="0"/>
+              <a:t>Telemetry</a:t>
+            </a:r>
+          </a:p>
+          <a:p>
+            <a:pPr marL="0" indent="0">
+              <a:buNone/>
+            </a:pPr>
+            <a:r>
+              <a:rPr lang="en-US" dirty="0"/>
+              <a:t>Text Message</a:t>
+            </a:r>
+          </a:p>
+          <a:p>
+            <a:pPr marL="0" indent="0">
+              <a:buNone/>
+            </a:pPr>
+            <a:r>
+              <a:rPr lang="en-US" dirty="0"/>
+              <a:t>Neighbor Info</a:t>
+            </a:r>
+          </a:p>
+          <a:p>
+            <a:pPr marL="0" indent="0">
+              <a:buNone/>
+            </a:pPr>
+            <a:r>
+              <a:rPr lang="en-US" dirty="0"/>
+              <a:t>Routing</a:t>
+            </a:r>
+          </a:p>
+          <a:p>
+            <a:pPr marL="0" indent="0">
+              <a:buNone/>
+            </a:pPr>
+            <a:r>
+              <a:rPr lang="en-US" dirty="0"/>
+              <a:t>Store Forward</a:t>
+            </a:r>
+          </a:p>
+          <a:p>
+            <a:pPr marL="0" indent="0">
+              <a:buNone/>
+            </a:pPr>
+            <a:r>
+              <a:rPr lang="en-US" dirty="0"/>
+              <a:t>Way Point</a:t>
+            </a:r>
+          </a:p>
+          <a:p>
+            <a:pPr marL="0" indent="0">
+              <a:buNone/>
+            </a:pPr>
+            <a:endParaRPr lang="en-US" dirty="0"/>
+          </a:p>
+          <a:p>
+            <a:pPr marL="0" indent="0">
+              <a:buNone/>
+            </a:pPr>
+            <a:endParaRPr lang="en-US" dirty="0"/>
+          </a:p>
+          <a:p>
+            <a:pPr marL="0" indent="0">
+              <a:buNone/>
+            </a:pPr>
+            <a:r>
+              <a:rPr lang="en-US" dirty="0"/>
+              <a:t>Reply</a:t>
+            </a:r>
+          </a:p>
+          <a:p>
+            <a:pPr marL="0" indent="0">
+              <a:buNone/>
+            </a:pPr>
+            <a:r>
+              <a:rPr lang="en-US" dirty="0"/>
+              <a:t>Traceroute</a:t>
+            </a:r>
+          </a:p>
+          <a:p>
+            <a:pPr marL="0" indent="0">
+              <a:buNone/>
+            </a:pPr>
+            <a:endParaRPr lang="en-US" dirty="0"/>
+          </a:p>
+        </p:txBody>
+      </p:sp>
+    </p:spTree>
+    <p:extLst>
+      <p:ext uri="{BB962C8B-B14F-4D97-AF65-F5344CB8AC3E}">
+        <p14:creationId xmlns:p14="http://schemas.microsoft.com/office/powerpoint/2010/main" val="252806561"/>
       </p:ext>
     </p:extLst>
   </p:cSld>

</xml_diff>